<commit_message>
Tweaks after a rehearsal
</commit_message>
<xml_diff>
--- a/Web Cryptography Workshop.pptx
+++ b/Web Cryptography Workshop.pptx
@@ -95,26 +95,27 @@
     <p:sldId id="359" r:id="rId89"/>
     <p:sldId id="363" r:id="rId90"/>
     <p:sldId id="395" r:id="rId91"/>
-    <p:sldId id="364" r:id="rId92"/>
-    <p:sldId id="365" r:id="rId93"/>
-    <p:sldId id="366" r:id="rId94"/>
-    <p:sldId id="367" r:id="rId95"/>
-    <p:sldId id="369" r:id="rId96"/>
-    <p:sldId id="368" r:id="rId97"/>
-    <p:sldId id="370" r:id="rId98"/>
-    <p:sldId id="371" r:id="rId99"/>
-    <p:sldId id="372" r:id="rId100"/>
-    <p:sldId id="373" r:id="rId101"/>
-    <p:sldId id="400" r:id="rId102"/>
-    <p:sldId id="374" r:id="rId103"/>
-    <p:sldId id="375" r:id="rId104"/>
-    <p:sldId id="376" r:id="rId105"/>
-    <p:sldId id="377" r:id="rId106"/>
-    <p:sldId id="379" r:id="rId107"/>
-    <p:sldId id="380" r:id="rId108"/>
-    <p:sldId id="381" r:id="rId109"/>
-    <p:sldId id="399" r:id="rId110"/>
-    <p:sldId id="397" r:id="rId111"/>
+    <p:sldId id="401" r:id="rId92"/>
+    <p:sldId id="364" r:id="rId93"/>
+    <p:sldId id="365" r:id="rId94"/>
+    <p:sldId id="366" r:id="rId95"/>
+    <p:sldId id="367" r:id="rId96"/>
+    <p:sldId id="369" r:id="rId97"/>
+    <p:sldId id="368" r:id="rId98"/>
+    <p:sldId id="370" r:id="rId99"/>
+    <p:sldId id="371" r:id="rId100"/>
+    <p:sldId id="372" r:id="rId101"/>
+    <p:sldId id="374" r:id="rId102"/>
+    <p:sldId id="375" r:id="rId103"/>
+    <p:sldId id="400" r:id="rId104"/>
+    <p:sldId id="373" r:id="rId105"/>
+    <p:sldId id="376" r:id="rId106"/>
+    <p:sldId id="377" r:id="rId107"/>
+    <p:sldId id="379" r:id="rId108"/>
+    <p:sldId id="380" r:id="rId109"/>
+    <p:sldId id="381" r:id="rId110"/>
+    <p:sldId id="399" r:id="rId111"/>
+    <p:sldId id="397" r:id="rId112"/>
   </p:sldIdLst>
   <p:sldSz cx="12192000" cy="6858000"/>
   <p:notesSz cx="6858000" cy="9144000"/>
@@ -3585,71 +3586,7 @@
           <a:p>
             <a:r>
               <a:rPr lang="en-US" dirty="0"/>
-              <a:t>This Lab is Different</a:t>
-            </a:r>
-          </a:p>
-        </p:txBody>
-      </p:sp>
-      <p:sp>
-        <p:nvSpPr>
-          <p:cNvPr id="4" name="Content Placeholder 3"/>
-          <p:cNvSpPr>
-            <a:spLocks noGrp="1"/>
-          </p:cNvSpPr>
-          <p:nvPr>
-            <p:ph idx="1"/>
-          </p:nvPr>
-        </p:nvSpPr>
-        <p:spPr/>
-        <p:txBody>
-          <a:bodyPr>
-            <a:normAutofit lnSpcReduction="10000"/>
-          </a:bodyPr>
-          <a:lstStyle/>
-          <a:p>
-            <a:r>
-              <a:rPr lang="en-US" dirty="0"/>
-              <a:t>No new cryptographic algorithms</a:t>
-            </a:r>
-          </a:p>
-          <a:p>
-            <a:r>
-              <a:rPr lang="en-US" dirty="0"/>
-              <a:t>New kinds of data objects</a:t>
-            </a:r>
-          </a:p>
-          <a:p>
-            <a:pPr lvl="1"/>
-            <a:r>
-              <a:rPr lang="en-US" dirty="0"/>
-              <a:t>Certificate signing request</a:t>
-            </a:r>
-          </a:p>
-          <a:p>
-            <a:pPr lvl="1"/>
-            <a:r>
-              <a:rPr lang="en-US" dirty="0"/>
-              <a:t>Certificate</a:t>
-            </a:r>
-          </a:p>
-          <a:p>
-            <a:r>
-              <a:rPr lang="en-US" dirty="0"/>
-              <a:t>No hands-on today</a:t>
-            </a:r>
-          </a:p>
-          <a:p>
-            <a:pPr lvl="1"/>
-            <a:r>
-              <a:rPr lang="en-US" dirty="0"/>
-              <a:t>There are too many details in X.509 to cover them right now</a:t>
-            </a:r>
-          </a:p>
-          <a:p>
-            <a:pPr lvl="1"/>
-            <a:r>
-              <a:rPr lang="en-US" dirty="0"/>
-              <a:t>Review the solution at a high level</a:t>
+              <a:t>Lab 5 – Self-signed X.509 Certificate</a:t>
             </a:r>
           </a:p>
         </p:txBody>
@@ -3657,7 +3594,7 @@
     </p:spTree>
     <p:extLst>
       <p:ext uri="{BB962C8B-B14F-4D97-AF65-F5344CB8AC3E}">
-        <p14:creationId xmlns:p14="http://schemas.microsoft.com/office/powerpoint/2010/main" val="3839191147"/>
+        <p14:creationId xmlns:p14="http://schemas.microsoft.com/office/powerpoint/2010/main" val="565460972"/>
       </p:ext>
     </p:extLst>
   </p:cSld>
@@ -3668,6 +3605,209 @@
 </file>
 
 <file path=ppt/slides/slide101.xml><?xml version="1.0" encoding="utf-8"?>
+<p:sld xmlns:a="http://schemas.openxmlformats.org/drawingml/2006/main" xmlns:r="http://schemas.openxmlformats.org/officeDocument/2006/relationships" xmlns:p="http://schemas.openxmlformats.org/presentationml/2006/main">
+  <p:cSld>
+    <p:spTree>
+      <p:nvGrpSpPr>
+        <p:cNvPr id="1" name=""/>
+        <p:cNvGrpSpPr/>
+        <p:nvPr/>
+      </p:nvGrpSpPr>
+      <p:grpSpPr>
+        <a:xfrm>
+          <a:off x="0" y="0"/>
+          <a:ext cx="0" cy="0"/>
+          <a:chOff x="0" y="0"/>
+          <a:chExt cx="0" cy="0"/>
+        </a:xfrm>
+      </p:grpSpPr>
+      <p:sp>
+        <p:nvSpPr>
+          <p:cNvPr id="2" name="Title 1"/>
+          <p:cNvSpPr>
+            <a:spLocks noGrp="1"/>
+          </p:cNvSpPr>
+          <p:nvPr>
+            <p:ph type="title"/>
+          </p:nvPr>
+        </p:nvSpPr>
+        <p:spPr/>
+        <p:txBody>
+          <a:bodyPr/>
+          <a:lstStyle/>
+          <a:p>
+            <a:r>
+              <a:rPr lang="en-US" dirty="0"/>
+              <a:t>What’s a Certificate?</a:t>
+            </a:r>
+          </a:p>
+        </p:txBody>
+      </p:sp>
+      <p:sp>
+        <p:nvSpPr>
+          <p:cNvPr id="3" name="Content Placeholder 2"/>
+          <p:cNvSpPr>
+            <a:spLocks noGrp="1"/>
+          </p:cNvSpPr>
+          <p:nvPr>
+            <p:ph idx="1"/>
+          </p:nvPr>
+        </p:nvSpPr>
+        <p:spPr/>
+        <p:txBody>
+          <a:bodyPr>
+            <a:normAutofit/>
+          </a:bodyPr>
+          <a:lstStyle/>
+          <a:p>
+            <a:r>
+              <a:rPr lang="en-US" dirty="0"/>
+              <a:t>A data structure containing a public key and identification of the owner of that key</a:t>
+            </a:r>
+          </a:p>
+          <a:p>
+            <a:r>
+              <a:rPr lang="en-US" dirty="0"/>
+              <a:t>Digitally signed by a Certificate Authority (CA)</a:t>
+            </a:r>
+          </a:p>
+          <a:p>
+            <a:r>
+              <a:rPr lang="en-US" dirty="0"/>
+              <a:t>Reliers trust the CA, so they trust that the identity in the certificate is correct</a:t>
+            </a:r>
+          </a:p>
+        </p:txBody>
+      </p:sp>
+    </p:spTree>
+    <p:extLst>
+      <p:ext uri="{BB962C8B-B14F-4D97-AF65-F5344CB8AC3E}">
+        <p14:creationId xmlns:p14="http://schemas.microsoft.com/office/powerpoint/2010/main" val="3116281624"/>
+      </p:ext>
+    </p:extLst>
+  </p:cSld>
+  <p:clrMapOvr>
+    <a:masterClrMapping/>
+  </p:clrMapOvr>
+</p:sld>
+</file>
+
+<file path=ppt/slides/slide102.xml><?xml version="1.0" encoding="utf-8"?>
+<p:sld xmlns:a="http://schemas.openxmlformats.org/drawingml/2006/main" xmlns:r="http://schemas.openxmlformats.org/officeDocument/2006/relationships" xmlns:p="http://schemas.openxmlformats.org/presentationml/2006/main">
+  <p:cSld>
+    <p:spTree>
+      <p:nvGrpSpPr>
+        <p:cNvPr id="1" name=""/>
+        <p:cNvGrpSpPr/>
+        <p:nvPr/>
+      </p:nvGrpSpPr>
+      <p:grpSpPr>
+        <a:xfrm>
+          <a:off x="0" y="0"/>
+          <a:ext cx="0" cy="0"/>
+          <a:chOff x="0" y="0"/>
+          <a:chExt cx="0" cy="0"/>
+        </a:xfrm>
+      </p:grpSpPr>
+      <p:sp>
+        <p:nvSpPr>
+          <p:cNvPr id="2" name="Title 1"/>
+          <p:cNvSpPr>
+            <a:spLocks noGrp="1"/>
+          </p:cNvSpPr>
+          <p:nvPr>
+            <p:ph type="title"/>
+          </p:nvPr>
+        </p:nvSpPr>
+        <p:spPr/>
+        <p:txBody>
+          <a:bodyPr/>
+          <a:lstStyle/>
+          <a:p>
+            <a:r>
+              <a:rPr lang="en-US" dirty="0"/>
+              <a:t>X.509</a:t>
+            </a:r>
+          </a:p>
+        </p:txBody>
+      </p:sp>
+      <p:sp>
+        <p:nvSpPr>
+          <p:cNvPr id="3" name="Content Placeholder 2"/>
+          <p:cNvSpPr>
+            <a:spLocks noGrp="1"/>
+          </p:cNvSpPr>
+          <p:nvPr>
+            <p:ph idx="1"/>
+          </p:nvPr>
+        </p:nvSpPr>
+        <p:spPr/>
+        <p:txBody>
+          <a:bodyPr>
+            <a:normAutofit fontScale="92500" lnSpcReduction="10000"/>
+          </a:bodyPr>
+          <a:lstStyle/>
+          <a:p>
+            <a:r>
+              <a:rPr lang="en-US" dirty="0"/>
+              <a:t>Standard format for certificates</a:t>
+            </a:r>
+          </a:p>
+          <a:p>
+            <a:r>
+              <a:rPr lang="en-US" dirty="0"/>
+              <a:t>Comes from X.500 ITU-T and OSI standards</a:t>
+            </a:r>
+          </a:p>
+          <a:p>
+            <a:pPr lvl="1"/>
+            <a:r>
+              <a:rPr lang="en-US" dirty="0"/>
+              <a:t>Created in the 1980s</a:t>
+            </a:r>
+          </a:p>
+          <a:p>
+            <a:r>
+              <a:rPr lang="en-US" dirty="0"/>
+              <a:t>ASN.1 “Abstract Syntax Notation”</a:t>
+            </a:r>
+          </a:p>
+          <a:p>
+            <a:pPr lvl="1"/>
+            <a:r>
+              <a:rPr lang="en-US" dirty="0"/>
+              <a:t>Defines the data structure</a:t>
+            </a:r>
+          </a:p>
+          <a:p>
+            <a:pPr lvl="1"/>
+            <a:r>
+              <a:rPr lang="en-US" dirty="0"/>
+              <a:t>BER and DER encoding into binary</a:t>
+            </a:r>
+          </a:p>
+          <a:p>
+            <a:r>
+              <a:rPr lang="en-US" dirty="0"/>
+              <a:t>Very compact, unambiguous, and horribly complex</a:t>
+            </a:r>
+          </a:p>
+        </p:txBody>
+      </p:sp>
+    </p:spTree>
+    <p:extLst>
+      <p:ext uri="{BB962C8B-B14F-4D97-AF65-F5344CB8AC3E}">
+        <p14:creationId xmlns:p14="http://schemas.microsoft.com/office/powerpoint/2010/main" val="2436711033"/>
+      </p:ext>
+    </p:extLst>
+  </p:cSld>
+  <p:clrMapOvr>
+    <a:masterClrMapping/>
+  </p:clrMapOvr>
+</p:sld>
+</file>
+
+<file path=ppt/slides/slide103.xml><?xml version="1.0" encoding="utf-8"?>
 <p:sld xmlns:a="http://schemas.openxmlformats.org/drawingml/2006/main" xmlns:r="http://schemas.openxmlformats.org/officeDocument/2006/relationships" xmlns:p="http://schemas.openxmlformats.org/presentationml/2006/main">
   <p:cSld>
     <p:spTree>
@@ -3767,209 +3907,6 @@
 </p:sld>
 </file>
 
-<file path=ppt/slides/slide102.xml><?xml version="1.0" encoding="utf-8"?>
-<p:sld xmlns:a="http://schemas.openxmlformats.org/drawingml/2006/main" xmlns:r="http://schemas.openxmlformats.org/officeDocument/2006/relationships" xmlns:p="http://schemas.openxmlformats.org/presentationml/2006/main">
-  <p:cSld>
-    <p:spTree>
-      <p:nvGrpSpPr>
-        <p:cNvPr id="1" name=""/>
-        <p:cNvGrpSpPr/>
-        <p:nvPr/>
-      </p:nvGrpSpPr>
-      <p:grpSpPr>
-        <a:xfrm>
-          <a:off x="0" y="0"/>
-          <a:ext cx="0" cy="0"/>
-          <a:chOff x="0" y="0"/>
-          <a:chExt cx="0" cy="0"/>
-        </a:xfrm>
-      </p:grpSpPr>
-      <p:sp>
-        <p:nvSpPr>
-          <p:cNvPr id="2" name="Title 1"/>
-          <p:cNvSpPr>
-            <a:spLocks noGrp="1"/>
-          </p:cNvSpPr>
-          <p:nvPr>
-            <p:ph type="title"/>
-          </p:nvPr>
-        </p:nvSpPr>
-        <p:spPr/>
-        <p:txBody>
-          <a:bodyPr/>
-          <a:lstStyle/>
-          <a:p>
-            <a:r>
-              <a:rPr lang="en-US" dirty="0"/>
-              <a:t>What’s a Certificate?</a:t>
-            </a:r>
-          </a:p>
-        </p:txBody>
-      </p:sp>
-      <p:sp>
-        <p:nvSpPr>
-          <p:cNvPr id="3" name="Content Placeholder 2"/>
-          <p:cNvSpPr>
-            <a:spLocks noGrp="1"/>
-          </p:cNvSpPr>
-          <p:nvPr>
-            <p:ph idx="1"/>
-          </p:nvPr>
-        </p:nvSpPr>
-        <p:spPr/>
-        <p:txBody>
-          <a:bodyPr>
-            <a:normAutofit/>
-          </a:bodyPr>
-          <a:lstStyle/>
-          <a:p>
-            <a:r>
-              <a:rPr lang="en-US" dirty="0"/>
-              <a:t>A data structure containing a public key and identification of the owner of that key</a:t>
-            </a:r>
-          </a:p>
-          <a:p>
-            <a:r>
-              <a:rPr lang="en-US" dirty="0"/>
-              <a:t>Digitally signed by a Certificate Authority (CA)</a:t>
-            </a:r>
-          </a:p>
-          <a:p>
-            <a:r>
-              <a:rPr lang="en-US" dirty="0"/>
-              <a:t>Reliers trust the CA, so they trust that the identity in the certificate is correct</a:t>
-            </a:r>
-          </a:p>
-        </p:txBody>
-      </p:sp>
-    </p:spTree>
-    <p:extLst>
-      <p:ext uri="{BB962C8B-B14F-4D97-AF65-F5344CB8AC3E}">
-        <p14:creationId xmlns:p14="http://schemas.microsoft.com/office/powerpoint/2010/main" val="3116281624"/>
-      </p:ext>
-    </p:extLst>
-  </p:cSld>
-  <p:clrMapOvr>
-    <a:masterClrMapping/>
-  </p:clrMapOvr>
-</p:sld>
-</file>
-
-<file path=ppt/slides/slide103.xml><?xml version="1.0" encoding="utf-8"?>
-<p:sld xmlns:a="http://schemas.openxmlformats.org/drawingml/2006/main" xmlns:r="http://schemas.openxmlformats.org/officeDocument/2006/relationships" xmlns:p="http://schemas.openxmlformats.org/presentationml/2006/main">
-  <p:cSld>
-    <p:spTree>
-      <p:nvGrpSpPr>
-        <p:cNvPr id="1" name=""/>
-        <p:cNvGrpSpPr/>
-        <p:nvPr/>
-      </p:nvGrpSpPr>
-      <p:grpSpPr>
-        <a:xfrm>
-          <a:off x="0" y="0"/>
-          <a:ext cx="0" cy="0"/>
-          <a:chOff x="0" y="0"/>
-          <a:chExt cx="0" cy="0"/>
-        </a:xfrm>
-      </p:grpSpPr>
-      <p:sp>
-        <p:nvSpPr>
-          <p:cNvPr id="2" name="Title 1"/>
-          <p:cNvSpPr>
-            <a:spLocks noGrp="1"/>
-          </p:cNvSpPr>
-          <p:nvPr>
-            <p:ph type="title"/>
-          </p:nvPr>
-        </p:nvSpPr>
-        <p:spPr/>
-        <p:txBody>
-          <a:bodyPr/>
-          <a:lstStyle/>
-          <a:p>
-            <a:r>
-              <a:rPr lang="en-US" dirty="0"/>
-              <a:t>X.509</a:t>
-            </a:r>
-          </a:p>
-        </p:txBody>
-      </p:sp>
-      <p:sp>
-        <p:nvSpPr>
-          <p:cNvPr id="3" name="Content Placeholder 2"/>
-          <p:cNvSpPr>
-            <a:spLocks noGrp="1"/>
-          </p:cNvSpPr>
-          <p:nvPr>
-            <p:ph idx="1"/>
-          </p:nvPr>
-        </p:nvSpPr>
-        <p:spPr/>
-        <p:txBody>
-          <a:bodyPr>
-            <a:normAutofit fontScale="92500" lnSpcReduction="10000"/>
-          </a:bodyPr>
-          <a:lstStyle/>
-          <a:p>
-            <a:r>
-              <a:rPr lang="en-US" dirty="0"/>
-              <a:t>Standard format for certificates</a:t>
-            </a:r>
-          </a:p>
-          <a:p>
-            <a:r>
-              <a:rPr lang="en-US" dirty="0"/>
-              <a:t>Comes from X.500 ITU-T and OSI standards</a:t>
-            </a:r>
-          </a:p>
-          <a:p>
-            <a:pPr lvl="1"/>
-            <a:r>
-              <a:rPr lang="en-US" dirty="0"/>
-              <a:t>Created in the 1980s</a:t>
-            </a:r>
-          </a:p>
-          <a:p>
-            <a:r>
-              <a:rPr lang="en-US" dirty="0"/>
-              <a:t>ASN.1 “Abstract Syntax Notation”</a:t>
-            </a:r>
-          </a:p>
-          <a:p>
-            <a:pPr lvl="1"/>
-            <a:r>
-              <a:rPr lang="en-US" dirty="0"/>
-              <a:t>Defines the data structure</a:t>
-            </a:r>
-          </a:p>
-          <a:p>
-            <a:pPr lvl="1"/>
-            <a:r>
-              <a:rPr lang="en-US" dirty="0"/>
-              <a:t>BER and DER encoding into binary</a:t>
-            </a:r>
-          </a:p>
-          <a:p>
-            <a:r>
-              <a:rPr lang="en-US" dirty="0"/>
-              <a:t>Very compact, unambiguous, and horribly complex</a:t>
-            </a:r>
-          </a:p>
-        </p:txBody>
-      </p:sp>
-    </p:spTree>
-    <p:extLst>
-      <p:ext uri="{BB962C8B-B14F-4D97-AF65-F5344CB8AC3E}">
-        <p14:creationId xmlns:p14="http://schemas.microsoft.com/office/powerpoint/2010/main" val="2436711033"/>
-      </p:ext>
-    </p:extLst>
-  </p:cSld>
-  <p:clrMapOvr>
-    <a:masterClrMapping/>
-  </p:clrMapOvr>
-</p:sld>
-</file>
-
 <file path=ppt/slides/slide104.xml><?xml version="1.0" encoding="utf-8"?>
 <p:sld xmlns:a="http://schemas.openxmlformats.org/drawingml/2006/main" xmlns:r="http://schemas.openxmlformats.org/officeDocument/2006/relationships" xmlns:p="http://schemas.openxmlformats.org/presentationml/2006/main">
   <p:cSld>
@@ -3989,7 +3926,7 @@
       </p:grpSpPr>
       <p:sp>
         <p:nvSpPr>
-          <p:cNvPr id="2" name="Title 1"/>
+          <p:cNvPr id="3" name="Title 2"/>
           <p:cNvSpPr>
             <a:spLocks noGrp="1"/>
           </p:cNvSpPr>
@@ -3999,65 +3936,76 @@
         </p:nvSpPr>
         <p:spPr/>
         <p:txBody>
+          <a:bodyPr/>
+          <a:lstStyle/>
+          <a:p>
+            <a:r>
+              <a:rPr lang="en-US" dirty="0"/>
+              <a:t>This Lab is Different</a:t>
+            </a:r>
+          </a:p>
+        </p:txBody>
+      </p:sp>
+      <p:sp>
+        <p:nvSpPr>
+          <p:cNvPr id="4" name="Content Placeholder 3"/>
+          <p:cNvSpPr>
+            <a:spLocks noGrp="1"/>
+          </p:cNvSpPr>
+          <p:nvPr>
+            <p:ph idx="1"/>
+          </p:nvPr>
+        </p:nvSpPr>
+        <p:spPr/>
+        <p:txBody>
           <a:bodyPr>
-            <a:normAutofit/>
+            <a:normAutofit lnSpcReduction="10000"/>
           </a:bodyPr>
           <a:lstStyle/>
           <a:p>
             <a:r>
               <a:rPr lang="en-US" dirty="0"/>
-              <a:t>We Won’t Do This from Scratch</a:t>
-            </a:r>
-          </a:p>
-        </p:txBody>
-      </p:sp>
-      <p:sp>
-        <p:nvSpPr>
-          <p:cNvPr id="3" name="Content Placeholder 2"/>
-          <p:cNvSpPr>
-            <a:spLocks noGrp="1"/>
-          </p:cNvSpPr>
-          <p:nvPr>
-            <p:ph idx="1"/>
-          </p:nvPr>
-        </p:nvSpPr>
-        <p:spPr/>
-        <p:txBody>
-          <a:bodyPr>
-            <a:normAutofit/>
-          </a:bodyPr>
-          <a:lstStyle/>
-          <a:p>
-            <a:r>
-              <a:rPr lang="en-US" dirty="0"/>
-              <a:t>Background needed for ASN.1 and encodings is enormous</a:t>
+              <a:t>No new cryptographic algorithms</a:t>
+            </a:r>
+          </a:p>
+          <a:p>
+            <a:r>
+              <a:rPr lang="en-US" dirty="0"/>
+              <a:t>New kinds of data objects</a:t>
             </a:r>
           </a:p>
           <a:p>
             <a:pPr lvl="1"/>
             <a:r>
               <a:rPr lang="en-US" dirty="0"/>
-              <a:t>See blog.engelke.com/tag/x-509 if you really want to try this (it feels so good when you stop)</a:t>
-            </a:r>
-          </a:p>
-          <a:p>
-            <a:r>
-              <a:rPr lang="en-US" dirty="0"/>
-              <a:t>Instead, we will use PKIjs library</a:t>
+              <a:t>Certificate signing request</a:t>
             </a:r>
           </a:p>
           <a:p>
             <a:pPr lvl="1"/>
             <a:r>
               <a:rPr lang="en-US" dirty="0"/>
-              <a:t>Excellent third-party library (PKIjs.org)</a:t>
+              <a:t>Certificate</a:t>
+            </a:r>
+          </a:p>
+          <a:p>
+            <a:r>
+              <a:rPr lang="en-US" dirty="0"/>
+              <a:t>No hands-on today</a:t>
             </a:r>
           </a:p>
           <a:p>
             <a:pPr lvl="1"/>
             <a:r>
               <a:rPr lang="en-US" dirty="0"/>
-              <a:t>Built on top of web crypto API</a:t>
+              <a:t>There are too many details in X.509 to cover them right now</a:t>
+            </a:r>
+          </a:p>
+          <a:p>
+            <a:pPr lvl="1"/>
+            <a:r>
+              <a:rPr lang="en-US" dirty="0"/>
+              <a:t>Review the solution at a high level</a:t>
             </a:r>
           </a:p>
         </p:txBody>
@@ -4065,7 +4013,7 @@
     </p:spTree>
     <p:extLst>
       <p:ext uri="{BB962C8B-B14F-4D97-AF65-F5344CB8AC3E}">
-        <p14:creationId xmlns:p14="http://schemas.microsoft.com/office/powerpoint/2010/main" val="427889295"/>
+        <p14:creationId xmlns:p14="http://schemas.microsoft.com/office/powerpoint/2010/main" val="3839191147"/>
       </p:ext>
     </p:extLst>
   </p:cSld>
@@ -4104,12 +4052,14 @@
         </p:nvSpPr>
         <p:spPr/>
         <p:txBody>
-          <a:bodyPr/>
-          <a:lstStyle/>
-          <a:p>
-            <a:r>
-              <a:rPr lang="en-US" dirty="0"/>
-              <a:t>PKIjs Concepts</a:t>
+          <a:bodyPr>
+            <a:normAutofit/>
+          </a:bodyPr>
+          <a:lstStyle/>
+          <a:p>
+            <a:r>
+              <a:rPr lang="en-US" dirty="0"/>
+              <a:t>We Won’t Do This from Scratch</a:t>
             </a:r>
           </a:p>
         </p:txBody>
@@ -4126,69 +4076,41 @@
         </p:nvSpPr>
         <p:spPr/>
         <p:txBody>
-          <a:bodyPr/>
-          <a:lstStyle/>
-          <a:p>
-            <a:r>
-              <a:rPr lang="en-US" b="1" dirty="0">
-                <a:latin typeface="+mn-lt"/>
-              </a:rPr>
-              <a:t>org.pkijs.simpl</a:t>
-            </a:r>
-            <a:r>
-              <a:rPr lang="en-US" dirty="0"/>
-              <a:t> name space</a:t>
-            </a:r>
-          </a:p>
-          <a:p>
-            <a:r>
-              <a:rPr lang="en-US" b="1" dirty="0">
-                <a:latin typeface="+mn-lt"/>
-              </a:rPr>
-              <a:t>CERT</a:t>
-            </a:r>
-            <a:r>
-              <a:rPr lang="en-US" dirty="0"/>
-              <a:t> is the x.509 object constructor</a:t>
-            </a:r>
-          </a:p>
-          <a:p>
-            <a:r>
-              <a:rPr lang="en-US" dirty="0"/>
-              <a:t>Important properties</a:t>
+          <a:bodyPr>
+            <a:normAutofit/>
+          </a:bodyPr>
+          <a:lstStyle/>
+          <a:p>
+            <a:r>
+              <a:rPr lang="en-US" dirty="0"/>
+              <a:t>Background needed for ASN.1 and encodings is enormous</a:t>
             </a:r>
           </a:p>
           <a:p>
             <a:pPr lvl="1"/>
             <a:r>
               <a:rPr lang="en-US" dirty="0"/>
-              <a:t>serialNumber – </a:t>
-            </a:r>
-            <a:r>
-              <a:rPr lang="en-US" b="1" dirty="0">
-                <a:latin typeface="+mn-lt"/>
-              </a:rPr>
-              <a:t>org.pkijs.asn1.INTEGER</a:t>
+              <a:t>See blog.engelke.com/tag/x-509 if you really want to try this (it feels so good when you stop)</a:t>
+            </a:r>
+          </a:p>
+          <a:p>
+            <a:r>
+              <a:rPr lang="en-US" dirty="0"/>
+              <a:t>Instead, we will use PKIjs library</a:t>
             </a:r>
           </a:p>
           <a:p>
             <a:pPr lvl="1"/>
             <a:r>
               <a:rPr lang="en-US" dirty="0"/>
-              <a:t>extensions – array of </a:t>
-            </a:r>
-            <a:r>
-              <a:rPr lang="en-US" b="1" dirty="0">
-                <a:latin typeface="+mn-lt"/>
-              </a:rPr>
-              <a:t>org.pkijs.simpl.EXTENSION</a:t>
+              <a:t>Excellent third-party library (PKIjs.org)</a:t>
             </a:r>
           </a:p>
           <a:p>
             <a:pPr lvl="1"/>
             <a:r>
               <a:rPr lang="en-US" dirty="0"/>
-              <a:t>Many, many, more</a:t>
+              <a:t>Built on top of web crypto API</a:t>
             </a:r>
           </a:p>
         </p:txBody>
@@ -4196,7 +4118,7 @@
     </p:spTree>
     <p:extLst>
       <p:ext uri="{BB962C8B-B14F-4D97-AF65-F5344CB8AC3E}">
-        <p14:creationId xmlns:p14="http://schemas.microsoft.com/office/powerpoint/2010/main" val="4229479179"/>
+        <p14:creationId xmlns:p14="http://schemas.microsoft.com/office/powerpoint/2010/main" val="427889295"/>
       </p:ext>
     </p:extLst>
   </p:cSld>
@@ -4240,7 +4162,86 @@
           <a:p>
             <a:r>
               <a:rPr lang="en-US" dirty="0"/>
-              <a:t>Solution Review</a:t>
+              <a:t>PKIjs Concepts</a:t>
+            </a:r>
+          </a:p>
+        </p:txBody>
+      </p:sp>
+      <p:sp>
+        <p:nvSpPr>
+          <p:cNvPr id="3" name="Content Placeholder 2"/>
+          <p:cNvSpPr>
+            <a:spLocks noGrp="1"/>
+          </p:cNvSpPr>
+          <p:nvPr>
+            <p:ph idx="1"/>
+          </p:nvPr>
+        </p:nvSpPr>
+        <p:spPr/>
+        <p:txBody>
+          <a:bodyPr/>
+          <a:lstStyle/>
+          <a:p>
+            <a:r>
+              <a:rPr lang="en-US" b="1" dirty="0">
+                <a:latin typeface="+mn-lt"/>
+              </a:rPr>
+              <a:t>org.pkijs.simpl</a:t>
+            </a:r>
+            <a:r>
+              <a:rPr lang="en-US" dirty="0"/>
+              <a:t> name space</a:t>
+            </a:r>
+          </a:p>
+          <a:p>
+            <a:r>
+              <a:rPr lang="en-US" b="1" dirty="0">
+                <a:latin typeface="+mn-lt"/>
+              </a:rPr>
+              <a:t>CERT</a:t>
+            </a:r>
+            <a:r>
+              <a:rPr lang="en-US" dirty="0"/>
+              <a:t> is the x.509 object constructor</a:t>
+            </a:r>
+          </a:p>
+          <a:p>
+            <a:r>
+              <a:rPr lang="en-US" dirty="0"/>
+              <a:t>Important properties</a:t>
+            </a:r>
+          </a:p>
+          <a:p>
+            <a:pPr lvl="1"/>
+            <a:r>
+              <a:rPr lang="en-US" dirty="0"/>
+              <a:t>serialNumber – </a:t>
+            </a:r>
+            <a:r>
+              <a:rPr lang="en-US" b="1" dirty="0">
+                <a:latin typeface="+mn-lt"/>
+              </a:rPr>
+              <a:t>org.pkijs.asn1.INTEGER</a:t>
+            </a:r>
+          </a:p>
+          <a:p>
+            <a:pPr lvl="1"/>
+            <a:r>
+              <a:rPr lang="en-US" dirty="0"/>
+              <a:t>extensions – array of </a:t>
+            </a:r>
+            <a:r>
+              <a:rPr lang="en-US" b="1" dirty="0">
+                <a:latin typeface="+mn-lt"/>
+              </a:rPr>
+              <a:t>org.pkijs.simpl.EXTENSION</a:t>
+            </a:r>
+          </a:p>
+          <a:p>
+            <a:pPr lvl="1"/>
+            <a:r>
+              <a:rPr lang="en-US" dirty="0"/>
+              <a:t>Many, many, more</a:t>
             </a:r>
           </a:p>
         </p:txBody>
@@ -4248,7 +4249,7 @@
     </p:spTree>
     <p:extLst>
       <p:ext uri="{BB962C8B-B14F-4D97-AF65-F5344CB8AC3E}">
-        <p14:creationId xmlns:p14="http://schemas.microsoft.com/office/powerpoint/2010/main" val="3100716253"/>
+        <p14:creationId xmlns:p14="http://schemas.microsoft.com/office/powerpoint/2010/main" val="4229479179"/>
       </p:ext>
     </p:extLst>
   </p:cSld>
@@ -4277,7 +4278,7 @@
       </p:grpSpPr>
       <p:sp>
         <p:nvSpPr>
-          <p:cNvPr id="3" name="Title 2"/>
+          <p:cNvPr id="2" name="Title 1"/>
           <p:cNvSpPr>
             <a:spLocks noGrp="1"/>
           </p:cNvSpPr>
@@ -4292,7 +4293,7 @@
           <a:p>
             <a:r>
               <a:rPr lang="en-US" dirty="0"/>
-              <a:t>Summing Up</a:t>
+              <a:t>Solution Review</a:t>
             </a:r>
           </a:p>
         </p:txBody>
@@ -4300,7 +4301,7 @@
     </p:spTree>
     <p:extLst>
       <p:ext uri="{BB962C8B-B14F-4D97-AF65-F5344CB8AC3E}">
-        <p14:creationId xmlns:p14="http://schemas.microsoft.com/office/powerpoint/2010/main" val="3921529591"/>
+        <p14:creationId xmlns:p14="http://schemas.microsoft.com/office/powerpoint/2010/main" val="3100716253"/>
       </p:ext>
     </p:extLst>
   </p:cSld>
@@ -4344,65 +4345,7 @@
           <a:p>
             <a:r>
               <a:rPr lang="en-US" dirty="0"/>
-              <a:t>Web Cryptography API</a:t>
-            </a:r>
-          </a:p>
-        </p:txBody>
-      </p:sp>
-      <p:sp>
-        <p:nvSpPr>
-          <p:cNvPr id="4" name="Content Placeholder 3"/>
-          <p:cNvSpPr>
-            <a:spLocks noGrp="1"/>
-          </p:cNvSpPr>
-          <p:nvPr>
-            <p:ph idx="1"/>
-          </p:nvPr>
-        </p:nvSpPr>
-        <p:spPr/>
-        <p:txBody>
-          <a:bodyPr>
-            <a:normAutofit fontScale="92500"/>
-          </a:bodyPr>
-          <a:lstStyle/>
-          <a:p>
-            <a:r>
-              <a:rPr lang="en-US" dirty="0"/>
-              <a:t>Enables end-to-end secrecy and authentication</a:t>
-            </a:r>
-          </a:p>
-          <a:p>
-            <a:pPr lvl="1"/>
-            <a:r>
-              <a:rPr lang="en-US" dirty="0"/>
-              <a:t>Uses well-established native libraries</a:t>
-            </a:r>
-          </a:p>
-          <a:p>
-            <a:pPr lvl="1"/>
-            <a:r>
-              <a:rPr lang="en-US" dirty="0"/>
-              <a:t>Faster and more secure than re-implementing in JavaScript</a:t>
-            </a:r>
-          </a:p>
-          <a:p>
-            <a:r>
-              <a:rPr lang="en-US" dirty="0"/>
-              <a:t>API is fairly stable</a:t>
-            </a:r>
-          </a:p>
-          <a:p>
-            <a:pPr lvl="1"/>
-            <a:r>
-              <a:rPr lang="en-US" dirty="0"/>
-              <a:t>Some algorithms that no (or only one) browser supports will be dropped</a:t>
-            </a:r>
-          </a:p>
-          <a:p>
-            <a:pPr lvl="1"/>
-            <a:r>
-              <a:rPr lang="en-US" dirty="0"/>
-              <a:t>Interoperability is good</a:t>
+              <a:t>Summing Up</a:t>
             </a:r>
           </a:p>
         </p:txBody>
@@ -4410,7 +4353,7 @@
     </p:spTree>
     <p:extLst>
       <p:ext uri="{BB962C8B-B14F-4D97-AF65-F5344CB8AC3E}">
-        <p14:creationId xmlns:p14="http://schemas.microsoft.com/office/powerpoint/2010/main" val="3157893684"/>
+        <p14:creationId xmlns:p14="http://schemas.microsoft.com/office/powerpoint/2010/main" val="3921529591"/>
       </p:ext>
     </p:extLst>
   </p:cSld>
@@ -4439,7 +4382,7 @@
       </p:grpSpPr>
       <p:sp>
         <p:nvSpPr>
-          <p:cNvPr id="2" name="Title 1"/>
+          <p:cNvPr id="3" name="Title 2"/>
           <p:cNvSpPr>
             <a:spLocks noGrp="1"/>
           </p:cNvSpPr>
@@ -4454,14 +4397,14 @@
           <a:p>
             <a:r>
               <a:rPr lang="en-US" dirty="0"/>
-              <a:t>Learn More About Cryptography</a:t>
-            </a:r>
-          </a:p>
-        </p:txBody>
-      </p:sp>
-      <p:sp>
-        <p:nvSpPr>
-          <p:cNvPr id="3" name="Content Placeholder 2"/>
+              <a:t>Web Cryptography API</a:t>
+            </a:r>
+          </a:p>
+        </p:txBody>
+      </p:sp>
+      <p:sp>
+        <p:nvSpPr>
+          <p:cNvPr id="4" name="Content Placeholder 3"/>
           <p:cNvSpPr>
             <a:spLocks noGrp="1"/>
           </p:cNvSpPr>
@@ -4472,84 +4415,47 @@
         <p:spPr/>
         <p:txBody>
           <a:bodyPr>
-            <a:normAutofit fontScale="92500" lnSpcReduction="10000"/>
+            <a:normAutofit fontScale="92500"/>
           </a:bodyPr>
           <a:lstStyle/>
           <a:p>
-            <a:pPr>
-              <a:lnSpc>
-                <a:spcPct val="110000"/>
-              </a:lnSpc>
-            </a:pPr>
-            <a:r>
-              <a:rPr lang="en-US" dirty="0"/>
-              <a:t>Coursera Cryptography I course</a:t>
-            </a:r>
-          </a:p>
-          <a:p>
-            <a:pPr lvl="1">
-              <a:lnSpc>
-                <a:spcPct val="110000"/>
-              </a:lnSpc>
-            </a:pPr>
-            <a:r>
-              <a:rPr lang="en-US" dirty="0"/>
-              <a:t>Excellent introduction to fundamentals</a:t>
-            </a:r>
-          </a:p>
-          <a:p>
-            <a:pPr lvl="1">
-              <a:lnSpc>
-                <a:spcPct val="110000"/>
-              </a:lnSpc>
-            </a:pPr>
-            <a:r>
-              <a:rPr lang="en-US" dirty="0"/>
-              <a:t>Next offering starts March 14</a:t>
-            </a:r>
-          </a:p>
-          <a:p>
-            <a:pPr lvl="1">
-              <a:lnSpc>
-                <a:spcPct val="110000"/>
-              </a:lnSpc>
-            </a:pPr>
-            <a:r>
-              <a:rPr lang="en-US" dirty="0"/>
-              <a:t>https://www.coursera.org/learn/crypto</a:t>
-            </a:r>
-          </a:p>
-          <a:p>
-            <a:pPr>
-              <a:lnSpc>
-                <a:spcPct val="110000"/>
-              </a:lnSpc>
-            </a:pPr>
-            <a:r>
-              <a:rPr lang="en-US" dirty="0"/>
-              <a:t>Coursera Cryptography II course</a:t>
-            </a:r>
-          </a:p>
-          <a:p>
-            <a:pPr lvl="1">
-              <a:lnSpc>
-                <a:spcPct val="110000"/>
-              </a:lnSpc>
-            </a:pPr>
-            <a:r>
-              <a:rPr lang="en-US" dirty="0"/>
-              <a:t>https://www.coursera.org/course/crypto2</a:t>
-            </a:r>
-          </a:p>
-          <a:p>
-            <a:pPr lvl="1">
-              <a:lnSpc>
-                <a:spcPct val="110000"/>
-              </a:lnSpc>
-            </a:pPr>
-            <a:r>
-              <a:rPr lang="en-US" dirty="0"/>
-              <a:t>Offered right after Lucy Van Pelt finally lets Charlie Brown kick the football</a:t>
+            <a:r>
+              <a:rPr lang="en-US" dirty="0"/>
+              <a:t>Enables end-to-end secrecy and authentication</a:t>
+            </a:r>
+          </a:p>
+          <a:p>
+            <a:pPr lvl="1"/>
+            <a:r>
+              <a:rPr lang="en-US" dirty="0"/>
+              <a:t>Uses well-established native libraries</a:t>
+            </a:r>
+          </a:p>
+          <a:p>
+            <a:pPr lvl="1"/>
+            <a:r>
+              <a:rPr lang="en-US" dirty="0"/>
+              <a:t>Faster and more secure than re-implementing in JavaScript</a:t>
+            </a:r>
+          </a:p>
+          <a:p>
+            <a:r>
+              <a:rPr lang="en-US" dirty="0"/>
+              <a:t>API is fairly stable</a:t>
+            </a:r>
+          </a:p>
+          <a:p>
+            <a:pPr lvl="1"/>
+            <a:r>
+              <a:rPr lang="en-US" dirty="0"/>
+              <a:t>Some algorithms that no (or only one) browser supports will be dropped</a:t>
+            </a:r>
+          </a:p>
+          <a:p>
+            <a:pPr lvl="1"/>
+            <a:r>
+              <a:rPr lang="en-US" dirty="0"/>
+              <a:t>Interoperability is good</a:t>
             </a:r>
           </a:p>
         </p:txBody>
@@ -4557,7 +4463,7 @@
     </p:spTree>
     <p:extLst>
       <p:ext uri="{BB962C8B-B14F-4D97-AF65-F5344CB8AC3E}">
-        <p14:creationId xmlns:p14="http://schemas.microsoft.com/office/powerpoint/2010/main" val="3800855222"/>
+        <p14:creationId xmlns:p14="http://schemas.microsoft.com/office/powerpoint/2010/main" val="3157893684"/>
       </p:ext>
     </p:extLst>
   </p:cSld>
@@ -4896,6 +4802,153 @@
 </file>
 
 <file path=ppt/slides/slide110.xml><?xml version="1.0" encoding="utf-8"?>
+<p:sld xmlns:a="http://schemas.openxmlformats.org/drawingml/2006/main" xmlns:r="http://schemas.openxmlformats.org/officeDocument/2006/relationships" xmlns:p="http://schemas.openxmlformats.org/presentationml/2006/main">
+  <p:cSld>
+    <p:spTree>
+      <p:nvGrpSpPr>
+        <p:cNvPr id="1" name=""/>
+        <p:cNvGrpSpPr/>
+        <p:nvPr/>
+      </p:nvGrpSpPr>
+      <p:grpSpPr>
+        <a:xfrm>
+          <a:off x="0" y="0"/>
+          <a:ext cx="0" cy="0"/>
+          <a:chOff x="0" y="0"/>
+          <a:chExt cx="0" cy="0"/>
+        </a:xfrm>
+      </p:grpSpPr>
+      <p:sp>
+        <p:nvSpPr>
+          <p:cNvPr id="2" name="Title 1"/>
+          <p:cNvSpPr>
+            <a:spLocks noGrp="1"/>
+          </p:cNvSpPr>
+          <p:nvPr>
+            <p:ph type="title"/>
+          </p:nvPr>
+        </p:nvSpPr>
+        <p:spPr/>
+        <p:txBody>
+          <a:bodyPr/>
+          <a:lstStyle/>
+          <a:p>
+            <a:r>
+              <a:rPr lang="en-US" dirty="0"/>
+              <a:t>Learn More About Cryptography</a:t>
+            </a:r>
+          </a:p>
+        </p:txBody>
+      </p:sp>
+      <p:sp>
+        <p:nvSpPr>
+          <p:cNvPr id="3" name="Content Placeholder 2"/>
+          <p:cNvSpPr>
+            <a:spLocks noGrp="1"/>
+          </p:cNvSpPr>
+          <p:nvPr>
+            <p:ph idx="1"/>
+          </p:nvPr>
+        </p:nvSpPr>
+        <p:spPr/>
+        <p:txBody>
+          <a:bodyPr>
+            <a:normAutofit fontScale="92500" lnSpcReduction="10000"/>
+          </a:bodyPr>
+          <a:lstStyle/>
+          <a:p>
+            <a:pPr>
+              <a:lnSpc>
+                <a:spcPct val="110000"/>
+              </a:lnSpc>
+            </a:pPr>
+            <a:r>
+              <a:rPr lang="en-US" dirty="0"/>
+              <a:t>Coursera Cryptography I course</a:t>
+            </a:r>
+          </a:p>
+          <a:p>
+            <a:pPr lvl="1">
+              <a:lnSpc>
+                <a:spcPct val="110000"/>
+              </a:lnSpc>
+            </a:pPr>
+            <a:r>
+              <a:rPr lang="en-US" dirty="0"/>
+              <a:t>Excellent introduction to fundamentals</a:t>
+            </a:r>
+          </a:p>
+          <a:p>
+            <a:pPr lvl="1">
+              <a:lnSpc>
+                <a:spcPct val="110000"/>
+              </a:lnSpc>
+            </a:pPr>
+            <a:r>
+              <a:rPr lang="en-US" dirty="0"/>
+              <a:t>Next offering starts March 14</a:t>
+            </a:r>
+          </a:p>
+          <a:p>
+            <a:pPr lvl="1">
+              <a:lnSpc>
+                <a:spcPct val="110000"/>
+              </a:lnSpc>
+            </a:pPr>
+            <a:r>
+              <a:rPr lang="en-US" dirty="0"/>
+              <a:t>https://www.coursera.org/learn/crypto</a:t>
+            </a:r>
+          </a:p>
+          <a:p>
+            <a:pPr>
+              <a:lnSpc>
+                <a:spcPct val="110000"/>
+              </a:lnSpc>
+            </a:pPr>
+            <a:r>
+              <a:rPr lang="en-US" dirty="0"/>
+              <a:t>Coursera Cryptography II course</a:t>
+            </a:r>
+          </a:p>
+          <a:p>
+            <a:pPr lvl="1">
+              <a:lnSpc>
+                <a:spcPct val="110000"/>
+              </a:lnSpc>
+            </a:pPr>
+            <a:r>
+              <a:rPr lang="en-US" dirty="0"/>
+              <a:t>https://www.coursera.org/course/crypto2</a:t>
+            </a:r>
+          </a:p>
+          <a:p>
+            <a:pPr lvl="1">
+              <a:lnSpc>
+                <a:spcPct val="110000"/>
+              </a:lnSpc>
+            </a:pPr>
+            <a:r>
+              <a:rPr lang="en-US" dirty="0"/>
+              <a:t>Offered right after Lucy Van Pelt finally lets Charlie Brown kick the football</a:t>
+            </a:r>
+          </a:p>
+        </p:txBody>
+      </p:sp>
+    </p:spTree>
+    <p:extLst>
+      <p:ext uri="{BB962C8B-B14F-4D97-AF65-F5344CB8AC3E}">
+        <p14:creationId xmlns:p14="http://schemas.microsoft.com/office/powerpoint/2010/main" val="3800855222"/>
+      </p:ext>
+    </p:extLst>
+  </p:cSld>
+  <p:clrMapOvr>
+    <a:masterClrMapping/>
+  </p:clrMapOvr>
+</p:sld>
+</file>
+
+<file path=ppt/slides/slide111.xml><?xml version="1.0" encoding="utf-8"?>
 <p:sld xmlns:a="http://schemas.openxmlformats.org/drawingml/2006/main" xmlns:r="http://schemas.openxmlformats.org/officeDocument/2006/relationships" xmlns:p="http://schemas.openxmlformats.org/presentationml/2006/main">
   <p:cSld>
     <p:spTree>
@@ -17041,7 +17094,7 @@
         <p:spPr/>
         <p:txBody>
           <a:bodyPr>
-            <a:normAutofit fontScale="77500" lnSpcReduction="20000"/>
+            <a:normAutofit fontScale="70000" lnSpcReduction="20000"/>
           </a:bodyPr>
           <a:lstStyle/>
           <a:p>
@@ -17119,6 +17172,17 @@
             <a:r>
               <a:rPr lang="en-US" dirty="0"/>
               <a:t>publicExponent – always use 65537 (0x10001)</a:t>
+            </a:r>
+          </a:p>
+          <a:p>
+            <a:pPr lvl="1">
+              <a:lnSpc>
+                <a:spcPct val="120000"/>
+              </a:lnSpc>
+            </a:pPr>
+            <a:r>
+              <a:rPr lang="en-US" dirty="0"/>
+              <a:t>hash – SHA-256</a:t>
             </a:r>
           </a:p>
           <a:p>
@@ -17517,7 +17581,7 @@
           <a:p>
             <a:r>
               <a:rPr lang="en-US" dirty="0"/>
-              <a:t>Possible Signing Steps</a:t>
+              <a:t>Signing Steps</a:t>
             </a:r>
           </a:p>
         </p:txBody>
@@ -17678,15 +17742,127 @@
           <a:p>
             <a:r>
               <a:rPr lang="en-US" dirty="0"/>
-              <a:t>Solution Review</a:t>
-            </a:r>
+              <a:t>Verifying Steps</a:t>
+            </a:r>
+          </a:p>
+        </p:txBody>
+      </p:sp>
+      <p:sp>
+        <p:nvSpPr>
+          <p:cNvPr id="3" name="Content Placeholder 2"/>
+          <p:cNvSpPr>
+            <a:spLocks noGrp="1"/>
+          </p:cNvSpPr>
+          <p:nvPr>
+            <p:ph idx="1"/>
+          </p:nvPr>
+        </p:nvSpPr>
+        <p:spPr/>
+        <p:txBody>
+          <a:bodyPr>
+            <a:normAutofit fontScale="92500" lnSpcReduction="10000"/>
+          </a:bodyPr>
+          <a:lstStyle/>
+          <a:p>
+            <a:pPr marL="742950" indent="-742950">
+              <a:lnSpc>
+                <a:spcPct val="110000"/>
+              </a:lnSpc>
+              <a:buFont typeface="+mj-lt"/>
+              <a:buAutoNum type="arabicPeriod"/>
+            </a:pPr>
+            <a:r>
+              <a:rPr lang="en-US" dirty="0"/>
+              <a:t>Import public key</a:t>
+            </a:r>
+          </a:p>
+          <a:p>
+            <a:pPr marL="742950" indent="-742950">
+              <a:lnSpc>
+                <a:spcPct val="110000"/>
+              </a:lnSpc>
+              <a:buFont typeface="+mj-lt"/>
+              <a:buAutoNum type="arabicPeriod"/>
+            </a:pPr>
+            <a:r>
+              <a:rPr lang="en-US" dirty="0"/>
+              <a:t>Set up FileReader</a:t>
+            </a:r>
+          </a:p>
+          <a:p>
+            <a:pPr marL="1200150" lvl="1" indent="-742950">
+              <a:lnSpc>
+                <a:spcPct val="110000"/>
+              </a:lnSpc>
+              <a:buFont typeface="+mj-lt"/>
+              <a:buAutoNum type="arabicPeriod"/>
+            </a:pPr>
+            <a:r>
+              <a:rPr lang="en-US" dirty="0"/>
+              <a:t>Point success and error handlers to functions</a:t>
+            </a:r>
+          </a:p>
+          <a:p>
+            <a:pPr marL="742950" indent="-742950">
+              <a:lnSpc>
+                <a:spcPct val="110000"/>
+              </a:lnSpc>
+              <a:buFont typeface="+mj-lt"/>
+              <a:buAutoNum type="arabicPeriod"/>
+            </a:pPr>
+            <a:r>
+              <a:rPr lang="en-US" dirty="0"/>
+              <a:t>Kick off FileReader (readAsArrayBuffer)</a:t>
+            </a:r>
+          </a:p>
+          <a:p>
+            <a:pPr marL="742950" indent="-742950">
+              <a:lnSpc>
+                <a:spcPct val="110000"/>
+              </a:lnSpc>
+              <a:buFont typeface="+mj-lt"/>
+              <a:buAutoNum type="arabicPeriod"/>
+            </a:pPr>
+            <a:r>
+              <a:rPr lang="en-US" dirty="0"/>
+              <a:t>Success handler function:</a:t>
+            </a:r>
+          </a:p>
+          <a:p>
+            <a:pPr marL="1200150" lvl="1" indent="-742950">
+              <a:lnSpc>
+                <a:spcPct val="110000"/>
+              </a:lnSpc>
+              <a:buFont typeface="+mj-lt"/>
+              <a:buAutoNum type="arabicPeriod"/>
+            </a:pPr>
+            <a:r>
+              <a:rPr lang="en-US" dirty="0"/>
+              <a:t>Get signature from form element</a:t>
+            </a:r>
+          </a:p>
+          <a:p>
+            <a:pPr marL="1200150" lvl="1" indent="-742950">
+              <a:lnSpc>
+                <a:spcPct val="110000"/>
+              </a:lnSpc>
+              <a:buFont typeface="+mj-lt"/>
+              <a:buAutoNum type="arabicPeriod"/>
+            </a:pPr>
+            <a:r>
+              <a:rPr lang="en-US" dirty="0"/>
+              <a:t>Verify FileReader ArrayBuffer result</a:t>
+            </a:r>
+          </a:p>
+          <a:p>
+            <a:endParaRPr lang="en-US" dirty="0"/>
           </a:p>
         </p:txBody>
       </p:sp>
     </p:spTree>
     <p:extLst>
       <p:ext uri="{BB962C8B-B14F-4D97-AF65-F5344CB8AC3E}">
-        <p14:creationId xmlns:p14="http://schemas.microsoft.com/office/powerpoint/2010/main" val="3739913855"/>
+        <p14:creationId xmlns:p14="http://schemas.microsoft.com/office/powerpoint/2010/main" val="2024441187"/>
       </p:ext>
     </p:extLst>
   </p:cSld>
@@ -17730,7 +17906,7 @@
           <a:p>
             <a:r>
               <a:rPr lang="en-US" dirty="0"/>
-              <a:t>Lab 4 – Public Key Encryption and Decryption</a:t>
+              <a:t>Solution Review</a:t>
             </a:r>
           </a:p>
         </p:txBody>
@@ -17738,7 +17914,7 @@
     </p:spTree>
     <p:extLst>
       <p:ext uri="{BB962C8B-B14F-4D97-AF65-F5344CB8AC3E}">
-        <p14:creationId xmlns:p14="http://schemas.microsoft.com/office/powerpoint/2010/main" val="1936782216"/>
+        <p14:creationId xmlns:p14="http://schemas.microsoft.com/office/powerpoint/2010/main" val="3739913855"/>
       </p:ext>
     </p:extLst>
   </p:cSld>
@@ -17767,7 +17943,7 @@
       </p:grpSpPr>
       <p:sp>
         <p:nvSpPr>
-          <p:cNvPr id="3" name="Title 2"/>
+          <p:cNvPr id="2" name="Title 1"/>
           <p:cNvSpPr>
             <a:spLocks noGrp="1"/>
           </p:cNvSpPr>
@@ -17781,53 +17957,8 @@
           <a:lstStyle/>
           <a:p>
             <a:r>
-              <a:rPr lang="en-US"/>
-              <a:t>PKC Has Limitations</a:t>
-            </a:r>
-            <a:endParaRPr lang="en-US" dirty="0"/>
-          </a:p>
-        </p:txBody>
-      </p:sp>
-      <p:sp>
-        <p:nvSpPr>
-          <p:cNvPr id="4" name="Content Placeholder 3"/>
-          <p:cNvSpPr>
-            <a:spLocks noGrp="1"/>
-          </p:cNvSpPr>
-          <p:nvPr>
-            <p:ph idx="1"/>
-          </p:nvPr>
-        </p:nvSpPr>
-        <p:spPr/>
-        <p:txBody>
-          <a:bodyPr/>
-          <a:lstStyle/>
-          <a:p>
-            <a:r>
-              <a:rPr lang="en-US" dirty="0"/>
-              <a:t>Extremely slow</a:t>
-            </a:r>
-          </a:p>
-          <a:p>
-            <a:r>
-              <a:rPr lang="en-US" dirty="0"/>
-              <a:t>Message size limited by key size</a:t>
-            </a:r>
-          </a:p>
-          <a:p>
-            <a:endParaRPr lang="en-US" dirty="0"/>
-          </a:p>
-          <a:p>
-            <a:r>
-              <a:rPr lang="en-US" dirty="0"/>
-              <a:t>So we can’t just encrypt plaintext using a PKC public key</a:t>
-            </a:r>
-          </a:p>
-          <a:p>
-            <a:pPr lvl="1"/>
-            <a:r>
-              <a:rPr lang="en-US" dirty="0"/>
-              <a:t>This didn’t come up for signing, because there PKC is only used on a digest, not whole message</a:t>
+              <a:rPr lang="en-US" dirty="0"/>
+              <a:t>Lab 4 – Public Key Encryption and Decryption</a:t>
             </a:r>
           </a:p>
         </p:txBody>
@@ -17835,7 +17966,7 @@
     </p:spTree>
     <p:extLst>
       <p:ext uri="{BB962C8B-B14F-4D97-AF65-F5344CB8AC3E}">
-        <p14:creationId xmlns:p14="http://schemas.microsoft.com/office/powerpoint/2010/main" val="594084453"/>
+        <p14:creationId xmlns:p14="http://schemas.microsoft.com/office/powerpoint/2010/main" val="1936782216"/>
       </p:ext>
     </p:extLst>
   </p:cSld>
@@ -17864,7 +17995,7 @@
       </p:grpSpPr>
       <p:sp>
         <p:nvSpPr>
-          <p:cNvPr id="2" name="Title 1"/>
+          <p:cNvPr id="3" name="Title 2"/>
           <p:cNvSpPr>
             <a:spLocks noGrp="1"/>
           </p:cNvSpPr>
@@ -17874,21 +18005,20 @@
         </p:nvSpPr>
         <p:spPr/>
         <p:txBody>
-          <a:bodyPr>
-            <a:normAutofit fontScale="90000"/>
-          </a:bodyPr>
-          <a:lstStyle/>
-          <a:p>
-            <a:r>
-              <a:rPr lang="en-US" dirty="0"/>
-              <a:t>Need a Symmetric/Asymmetric Hybrid</a:t>
-            </a:r>
-          </a:p>
-        </p:txBody>
-      </p:sp>
-      <p:sp>
-        <p:nvSpPr>
-          <p:cNvPr id="3" name="Content Placeholder 2"/>
+          <a:bodyPr/>
+          <a:lstStyle/>
+          <a:p>
+            <a:r>
+              <a:rPr lang="en-US"/>
+              <a:t>PKC Has Limitations</a:t>
+            </a:r>
+            <a:endParaRPr lang="en-US" dirty="0"/>
+          </a:p>
+        </p:txBody>
+      </p:sp>
+      <p:sp>
+        <p:nvSpPr>
+          <p:cNvPr id="4" name="Content Placeholder 3"/>
           <p:cNvSpPr>
             <a:spLocks noGrp="1"/>
           </p:cNvSpPr>
@@ -17898,50 +18028,34 @@
         </p:nvSpPr>
         <p:spPr/>
         <p:txBody>
-          <a:bodyPr>
-            <a:normAutofit lnSpcReduction="10000"/>
-          </a:bodyPr>
-          <a:lstStyle/>
-          <a:p>
-            <a:r>
-              <a:rPr lang="en-US" dirty="0"/>
-              <a:t>Create a random symmetric key</a:t>
+          <a:bodyPr/>
+          <a:lstStyle/>
+          <a:p>
+            <a:r>
+              <a:rPr lang="en-US" dirty="0"/>
+              <a:t>Extremely slow</a:t>
+            </a:r>
+          </a:p>
+          <a:p>
+            <a:r>
+              <a:rPr lang="en-US" dirty="0"/>
+              <a:t>Message size limited by key size</a:t>
+            </a:r>
+          </a:p>
+          <a:p>
+            <a:endParaRPr lang="en-US" dirty="0"/>
+          </a:p>
+          <a:p>
+            <a:r>
+              <a:rPr lang="en-US" dirty="0"/>
+              <a:t>So we can’t just encrypt plaintext using a PKC public key</a:t>
             </a:r>
           </a:p>
           <a:p>
             <a:pPr lvl="1"/>
             <a:r>
               <a:rPr lang="en-US" dirty="0"/>
-              <a:t>This is called the </a:t>
-            </a:r>
-            <a:r>
-              <a:rPr lang="en-US" b="1" i="1" dirty="0"/>
-              <a:t>session key</a:t>
-            </a:r>
-          </a:p>
-          <a:p>
-            <a:r>
-              <a:rPr lang="en-US" dirty="0"/>
-              <a:t>Encrypt the plaintext with the session key</a:t>
-            </a:r>
-          </a:p>
-          <a:p>
-            <a:r>
-              <a:rPr lang="en-US" dirty="0"/>
-              <a:t>Encrypt the session key with the public key using PKC</a:t>
-            </a:r>
-          </a:p>
-          <a:p>
-            <a:r>
-              <a:rPr lang="en-US" dirty="0"/>
-              <a:t>Decryption reverses this</a:t>
-            </a:r>
-          </a:p>
-          <a:p>
-            <a:pPr lvl="1"/>
-            <a:r>
-              <a:rPr lang="en-US" dirty="0"/>
-              <a:t>Uses the private key to decrypt the session key</a:t>
+              <a:t>This didn’t come up for signing, because there PKC is only used on a digest, not whole message</a:t>
             </a:r>
           </a:p>
         </p:txBody>
@@ -17949,7 +18063,7 @@
     </p:spTree>
     <p:extLst>
       <p:ext uri="{BB962C8B-B14F-4D97-AF65-F5344CB8AC3E}">
-        <p14:creationId xmlns:p14="http://schemas.microsoft.com/office/powerpoint/2010/main" val="2788134890"/>
+        <p14:creationId xmlns:p14="http://schemas.microsoft.com/office/powerpoint/2010/main" val="594084453"/>
       </p:ext>
     </p:extLst>
   </p:cSld>
@@ -17988,6 +18102,120 @@
         </p:nvSpPr>
         <p:spPr/>
         <p:txBody>
+          <a:bodyPr>
+            <a:normAutofit fontScale="90000"/>
+          </a:bodyPr>
+          <a:lstStyle/>
+          <a:p>
+            <a:r>
+              <a:rPr lang="en-US" dirty="0"/>
+              <a:t>Need a Symmetric/Asymmetric Hybrid</a:t>
+            </a:r>
+          </a:p>
+        </p:txBody>
+      </p:sp>
+      <p:sp>
+        <p:nvSpPr>
+          <p:cNvPr id="3" name="Content Placeholder 2"/>
+          <p:cNvSpPr>
+            <a:spLocks noGrp="1"/>
+          </p:cNvSpPr>
+          <p:nvPr>
+            <p:ph idx="1"/>
+          </p:nvPr>
+        </p:nvSpPr>
+        <p:spPr/>
+        <p:txBody>
+          <a:bodyPr>
+            <a:normAutofit lnSpcReduction="10000"/>
+          </a:bodyPr>
+          <a:lstStyle/>
+          <a:p>
+            <a:r>
+              <a:rPr lang="en-US" dirty="0"/>
+              <a:t>Create a random symmetric key</a:t>
+            </a:r>
+          </a:p>
+          <a:p>
+            <a:pPr lvl="1"/>
+            <a:r>
+              <a:rPr lang="en-US" dirty="0"/>
+              <a:t>This is called the </a:t>
+            </a:r>
+            <a:r>
+              <a:rPr lang="en-US" b="1" i="1" dirty="0"/>
+              <a:t>session key</a:t>
+            </a:r>
+          </a:p>
+          <a:p>
+            <a:r>
+              <a:rPr lang="en-US" dirty="0"/>
+              <a:t>Encrypt the plaintext with the session key</a:t>
+            </a:r>
+          </a:p>
+          <a:p>
+            <a:r>
+              <a:rPr lang="en-US" dirty="0"/>
+              <a:t>Encrypt the session key with the public key using PKC</a:t>
+            </a:r>
+          </a:p>
+          <a:p>
+            <a:r>
+              <a:rPr lang="en-US" dirty="0"/>
+              <a:t>Decryption reverses this</a:t>
+            </a:r>
+          </a:p>
+          <a:p>
+            <a:pPr lvl="1"/>
+            <a:r>
+              <a:rPr lang="en-US" dirty="0"/>
+              <a:t>Uses the private key to decrypt the session key</a:t>
+            </a:r>
+          </a:p>
+        </p:txBody>
+      </p:sp>
+    </p:spTree>
+    <p:extLst>
+      <p:ext uri="{BB962C8B-B14F-4D97-AF65-F5344CB8AC3E}">
+        <p14:creationId xmlns:p14="http://schemas.microsoft.com/office/powerpoint/2010/main" val="2788134890"/>
+      </p:ext>
+    </p:extLst>
+  </p:cSld>
+  <p:clrMapOvr>
+    <a:masterClrMapping/>
+  </p:clrMapOvr>
+</p:sld>
+</file>
+
+<file path=ppt/slides/slide96.xml><?xml version="1.0" encoding="utf-8"?>
+<p:sld xmlns:a="http://schemas.openxmlformats.org/drawingml/2006/main" xmlns:r="http://schemas.openxmlformats.org/officeDocument/2006/relationships" xmlns:p="http://schemas.openxmlformats.org/presentationml/2006/main">
+  <p:cSld>
+    <p:spTree>
+      <p:nvGrpSpPr>
+        <p:cNvPr id="1" name=""/>
+        <p:cNvGrpSpPr/>
+        <p:nvPr/>
+      </p:nvGrpSpPr>
+      <p:grpSpPr>
+        <a:xfrm>
+          <a:off x="0" y="0"/>
+          <a:ext cx="0" cy="0"/>
+          <a:chOff x="0" y="0"/>
+          <a:chExt cx="0" cy="0"/>
+        </a:xfrm>
+      </p:grpSpPr>
+      <p:sp>
+        <p:nvSpPr>
+          <p:cNvPr id="2" name="Title 1"/>
+          <p:cNvSpPr>
+            <a:spLocks noGrp="1"/>
+          </p:cNvSpPr>
+          <p:nvPr>
+            <p:ph type="title"/>
+          </p:nvPr>
+        </p:nvSpPr>
+        <p:spPr/>
+        <p:txBody>
           <a:bodyPr/>
           <a:lstStyle/>
           <a:p>
@@ -18047,7 +18275,7 @@
 </p:sld>
 </file>
 
-<file path=ppt/slides/slide96.xml><?xml version="1.0" encoding="utf-8"?>
+<file path=ppt/slides/slide97.xml><?xml version="1.0" encoding="utf-8"?>
 <p:sld xmlns:a="http://schemas.openxmlformats.org/drawingml/2006/main" xmlns:r="http://schemas.openxmlformats.org/officeDocument/2006/relationships" xmlns:p="http://schemas.openxmlformats.org/presentationml/2006/main">
   <p:cSld>
     <p:spTree>
@@ -18171,106 +18399,6 @@
 </p:sld>
 </file>
 
-<file path=ppt/slides/slide97.xml><?xml version="1.0" encoding="utf-8"?>
-<p:sld xmlns:a="http://schemas.openxmlformats.org/drawingml/2006/main" xmlns:r="http://schemas.openxmlformats.org/officeDocument/2006/relationships" xmlns:p="http://schemas.openxmlformats.org/presentationml/2006/main">
-  <p:cSld>
-    <p:spTree>
-      <p:nvGrpSpPr>
-        <p:cNvPr id="1" name=""/>
-        <p:cNvGrpSpPr/>
-        <p:nvPr/>
-      </p:nvGrpSpPr>
-      <p:grpSpPr>
-        <a:xfrm>
-          <a:off x="0" y="0"/>
-          <a:ext cx="0" cy="0"/>
-          <a:chOff x="0" y="0"/>
-          <a:chExt cx="0" cy="0"/>
-        </a:xfrm>
-      </p:grpSpPr>
-      <p:sp>
-        <p:nvSpPr>
-          <p:cNvPr id="2" name="Title 1"/>
-          <p:cNvSpPr>
-            <a:spLocks noGrp="1"/>
-          </p:cNvSpPr>
-          <p:nvPr>
-            <p:ph type="title"/>
-          </p:nvPr>
-        </p:nvSpPr>
-        <p:spPr/>
-        <p:txBody>
-          <a:bodyPr/>
-          <a:lstStyle/>
-          <a:p>
-            <a:r>
-              <a:rPr lang="en-US" dirty="0"/>
-              <a:t>New Background</a:t>
-            </a:r>
-          </a:p>
-        </p:txBody>
-      </p:sp>
-      <p:sp>
-        <p:nvSpPr>
-          <p:cNvPr id="3" name="Content Placeholder 2"/>
-          <p:cNvSpPr>
-            <a:spLocks noGrp="1"/>
-          </p:cNvSpPr>
-          <p:nvPr>
-            <p:ph idx="1"/>
-          </p:nvPr>
-        </p:nvSpPr>
-        <p:spPr/>
-        <p:txBody>
-          <a:bodyPr/>
-          <a:lstStyle/>
-          <a:p>
-            <a:r>
-              <a:rPr lang="en-US" dirty="0"/>
-              <a:t>Use RSA-OAEP public key algorithm</a:t>
-            </a:r>
-          </a:p>
-          <a:p>
-            <a:pPr lvl="1"/>
-            <a:r>
-              <a:rPr lang="en-US" dirty="0"/>
-              <a:t>2048 bit modulus</a:t>
-            </a:r>
-          </a:p>
-          <a:p>
-            <a:pPr lvl="1"/>
-            <a:r>
-              <a:rPr lang="en-US" dirty="0"/>
-              <a:t>65537 public exponent</a:t>
-            </a:r>
-          </a:p>
-          <a:p>
-            <a:r>
-              <a:rPr lang="en-US" dirty="0"/>
-              <a:t>Use AES-CBC with 256-bit key for symmetric algorithm</a:t>
-            </a:r>
-          </a:p>
-          <a:p>
-            <a:r>
-              <a:rPr lang="en-US" dirty="0"/>
-              <a:t>See hints in lab4.js for more</a:t>
-            </a:r>
-          </a:p>
-        </p:txBody>
-      </p:sp>
-    </p:spTree>
-    <p:extLst>
-      <p:ext uri="{BB962C8B-B14F-4D97-AF65-F5344CB8AC3E}">
-        <p14:creationId xmlns:p14="http://schemas.microsoft.com/office/powerpoint/2010/main" val="385194889"/>
-      </p:ext>
-    </p:extLst>
-  </p:cSld>
-  <p:clrMapOvr>
-    <a:masterClrMapping/>
-  </p:clrMapOvr>
-</p:sld>
-</file>
-
 <file path=ppt/slides/slide98.xml><?xml version="1.0" encoding="utf-8"?>
 <p:sld xmlns:a="http://schemas.openxmlformats.org/drawingml/2006/main" xmlns:r="http://schemas.openxmlformats.org/officeDocument/2006/relationships" xmlns:p="http://schemas.openxmlformats.org/presentationml/2006/main">
   <p:cSld>
@@ -18305,7 +18433,62 @@
           <a:p>
             <a:r>
               <a:rPr lang="en-US" dirty="0"/>
-              <a:t>Review Solution</a:t>
+              <a:t>New Background</a:t>
+            </a:r>
+          </a:p>
+        </p:txBody>
+      </p:sp>
+      <p:sp>
+        <p:nvSpPr>
+          <p:cNvPr id="3" name="Content Placeholder 2"/>
+          <p:cNvSpPr>
+            <a:spLocks noGrp="1"/>
+          </p:cNvSpPr>
+          <p:nvPr>
+            <p:ph idx="1"/>
+          </p:nvPr>
+        </p:nvSpPr>
+        <p:spPr/>
+        <p:txBody>
+          <a:bodyPr/>
+          <a:lstStyle/>
+          <a:p>
+            <a:r>
+              <a:rPr lang="en-US" dirty="0"/>
+              <a:t>Use RSA-OAEP public key algorithm</a:t>
+            </a:r>
+          </a:p>
+          <a:p>
+            <a:pPr lvl="1"/>
+            <a:r>
+              <a:rPr lang="en-US" dirty="0"/>
+              <a:t>2048 bit modulus</a:t>
+            </a:r>
+          </a:p>
+          <a:p>
+            <a:pPr lvl="1"/>
+            <a:r>
+              <a:rPr lang="en-US" dirty="0"/>
+              <a:t>65537 public exponent</a:t>
+            </a:r>
+          </a:p>
+          <a:p>
+            <a:pPr lvl="1"/>
+            <a:r>
+              <a:rPr lang="en-US" dirty="0"/>
+              <a:t>SHA-256 hash</a:t>
+            </a:r>
+          </a:p>
+          <a:p>
+            <a:r>
+              <a:rPr lang="en-US" dirty="0"/>
+              <a:t>Use AES-CBC with 256-bit key for symmetric algorithm</a:t>
+            </a:r>
+          </a:p>
+          <a:p>
+            <a:r>
+              <a:rPr lang="en-US" dirty="0"/>
+              <a:t>See hints in lab4.js for more</a:t>
             </a:r>
           </a:p>
         </p:txBody>
@@ -18313,7 +18496,7 @@
     </p:spTree>
     <p:extLst>
       <p:ext uri="{BB962C8B-B14F-4D97-AF65-F5344CB8AC3E}">
-        <p14:creationId xmlns:p14="http://schemas.microsoft.com/office/powerpoint/2010/main" val="138531813"/>
+        <p14:creationId xmlns:p14="http://schemas.microsoft.com/office/powerpoint/2010/main" val="385194889"/>
       </p:ext>
     </p:extLst>
   </p:cSld>
@@ -18342,7 +18525,7 @@
       </p:grpSpPr>
       <p:sp>
         <p:nvSpPr>
-          <p:cNvPr id="3" name="Title 2"/>
+          <p:cNvPr id="2" name="Title 1"/>
           <p:cNvSpPr>
             <a:spLocks noGrp="1"/>
           </p:cNvSpPr>
@@ -18357,7 +18540,7 @@
           <a:p>
             <a:r>
               <a:rPr lang="en-US" dirty="0"/>
-              <a:t>Lab 5 – Self-signed X.509 Certificate</a:t>
+              <a:t>Review Solution</a:t>
             </a:r>
           </a:p>
         </p:txBody>
@@ -18365,7 +18548,7 @@
     </p:spTree>
     <p:extLst>
       <p:ext uri="{BB962C8B-B14F-4D97-AF65-F5344CB8AC3E}">
-        <p14:creationId xmlns:p14="http://schemas.microsoft.com/office/powerpoint/2010/main" val="565460972"/>
+        <p14:creationId xmlns:p14="http://schemas.microsoft.com/office/powerpoint/2010/main" val="138531813"/>
       </p:ext>
     </p:extLst>
   </p:cSld>

</xml_diff>

<commit_message>
Final tweaks before workshop
</commit_message>
<xml_diff>
--- a/Web Cryptography Workshop.pptx
+++ b/Web Cryptography Workshop.pptx
@@ -389,7 +389,7 @@
           <a:p>
             <a:fld id="{32084A37-9F68-488B-9C18-9E8E9428C104}" type="datetimeFigureOut">
               <a:rPr lang="en-US" smtClean="0"/>
-              <a:t>3/6/2016</a:t>
+              <a:t>3/7/2016</a:t>
             </a:fld>
             <a:endParaRPr lang="en-US" dirty="0"/>
           </a:p>
@@ -557,7 +557,7 @@
           <a:p>
             <a:fld id="{32084A37-9F68-488B-9C18-9E8E9428C104}" type="datetimeFigureOut">
               <a:rPr lang="en-US" smtClean="0"/>
-              <a:t>3/6/2016</a:t>
+              <a:t>3/7/2016</a:t>
             </a:fld>
             <a:endParaRPr lang="en-US" dirty="0"/>
           </a:p>
@@ -735,7 +735,7 @@
           <a:p>
             <a:fld id="{32084A37-9F68-488B-9C18-9E8E9428C104}" type="datetimeFigureOut">
               <a:rPr lang="en-US" smtClean="0"/>
-              <a:t>3/6/2016</a:t>
+              <a:t>3/7/2016</a:t>
             </a:fld>
             <a:endParaRPr lang="en-US" dirty="0"/>
           </a:p>
@@ -1007,7 +1007,7 @@
           <a:p>
             <a:fld id="{32084A37-9F68-488B-9C18-9E8E9428C104}" type="datetimeFigureOut">
               <a:rPr lang="en-US" smtClean="0"/>
-              <a:t>3/6/2016</a:t>
+              <a:t>3/7/2016</a:t>
             </a:fld>
             <a:endParaRPr lang="en-US" dirty="0"/>
           </a:p>
@@ -1167,7 +1167,7 @@
           <a:p>
             <a:fld id="{32084A37-9F68-488B-9C18-9E8E9428C104}" type="datetimeFigureOut">
               <a:rPr lang="en-US" smtClean="0"/>
-              <a:t>3/6/2016</a:t>
+              <a:t>3/7/2016</a:t>
             </a:fld>
             <a:endParaRPr lang="en-US" dirty="0"/>
           </a:p>
@@ -1432,7 +1432,7 @@
           <a:p>
             <a:fld id="{32084A37-9F68-488B-9C18-9E8E9428C104}" type="datetimeFigureOut">
               <a:rPr lang="en-US" smtClean="0"/>
-              <a:t>3/6/2016</a:t>
+              <a:t>3/7/2016</a:t>
             </a:fld>
             <a:endParaRPr lang="en-US" dirty="0"/>
           </a:p>
@@ -1796,7 +1796,7 @@
           <a:p>
             <a:fld id="{32084A37-9F68-488B-9C18-9E8E9428C104}" type="datetimeFigureOut">
               <a:rPr lang="en-US" smtClean="0"/>
-              <a:t>3/6/2016</a:t>
+              <a:t>3/7/2016</a:t>
             </a:fld>
             <a:endParaRPr lang="en-US" dirty="0"/>
           </a:p>
@@ -1951,7 +1951,7 @@
           <a:p>
             <a:fld id="{32084A37-9F68-488B-9C18-9E8E9428C104}" type="datetimeFigureOut">
               <a:rPr lang="en-US" smtClean="0"/>
-              <a:t>3/6/2016</a:t>
+              <a:t>3/7/2016</a:t>
             </a:fld>
             <a:endParaRPr lang="en-US" dirty="0"/>
           </a:p>
@@ -2363,7 +2363,7 @@
           <a:p>
             <a:fld id="{32084A37-9F68-488B-9C18-9E8E9428C104}" type="datetimeFigureOut">
               <a:rPr lang="en-US" smtClean="0"/>
-              <a:t>3/6/2016</a:t>
+              <a:t>3/7/2016</a:t>
             </a:fld>
             <a:endParaRPr lang="en-US" dirty="0"/>
           </a:p>
@@ -2615,7 +2615,7 @@
           <a:p>
             <a:fld id="{32084A37-9F68-488B-9C18-9E8E9428C104}" type="datetimeFigureOut">
               <a:rPr lang="en-US" smtClean="0"/>
-              <a:t>3/6/2016</a:t>
+              <a:t>3/7/2016</a:t>
             </a:fld>
             <a:endParaRPr lang="en-US" dirty="0"/>
           </a:p>
@@ -2826,7 +2826,7 @@
           <a:p>
             <a:fld id="{32084A37-9F68-488B-9C18-9E8E9428C104}" type="datetimeFigureOut">
               <a:rPr lang="en-US" smtClean="0"/>
-              <a:t>3/6/2016</a:t>
+              <a:t>3/7/2016</a:t>
             </a:fld>
             <a:endParaRPr lang="en-US" dirty="0"/>
           </a:p>
@@ -3265,7 +3265,9 @@
         </p:nvSpPr>
         <p:spPr/>
         <p:txBody>
-          <a:bodyPr/>
+          <a:bodyPr>
+            <a:normAutofit lnSpcReduction="10000"/>
+          </a:bodyPr>
           <a:lstStyle/>
           <a:p>
             <a:r>
@@ -3277,6 +3279,15 @@
             <a:r>
               <a:rPr lang="en-US" dirty="0"/>
               <a:t>March 8, 2016</a:t>
+            </a:r>
+          </a:p>
+          <a:p>
+            <a:endParaRPr lang="en-US" dirty="0"/>
+          </a:p>
+          <a:p>
+            <a:r>
+              <a:rPr lang="en-US" dirty="0"/>
+              <a:t>fluent@engelke.com           fluent@lauriewhite.org</a:t>
             </a:r>
           </a:p>
         </p:txBody>
@@ -15190,9 +15201,10 @@
           <a:lstStyle/>
           <a:p>
             <a:r>
-              <a:rPr lang="en-US" dirty="0"/>
-              <a:t>Possible Steps</a:t>
-            </a:r>
+              <a:rPr lang="en-US"/>
+              <a:t>Steps</a:t>
+            </a:r>
+            <a:endParaRPr lang="en-US" dirty="0"/>
           </a:p>
         </p:txBody>
       </p:sp>

</xml_diff>